<commit_message>
More slides and updates.
</commit_message>
<xml_diff>
--- a/slides/1_intro.pptx
+++ b/slides/1_intro.pptx
@@ -203,7 +203,7 @@
           <a:p>
             <a:fld id="{B5C8DF45-37A1-BF41-9FCE-B6A5DF0F5EDC}" type="datetimeFigureOut">
               <a:rPr lang="en-US" smtClean="0"/>
-              <a:t>8/19/14</a:t>
+              <a:t>9/4/14</a:t>
             </a:fld>
             <a:endParaRPr lang="en-US"/>
           </a:p>
@@ -1241,7 +1241,7 @@
           <a:p>
             <a:fld id="{D998C644-8D75-A848-B6FF-594B8CAF1B37}" type="datetimeFigureOut">
               <a:rPr lang="en-US" smtClean="0"/>
-              <a:t>8/19/14</a:t>
+              <a:t>9/4/14</a:t>
             </a:fld>
             <a:endParaRPr lang="en-US"/>
           </a:p>
@@ -1411,7 +1411,7 @@
           <a:p>
             <a:fld id="{D998C644-8D75-A848-B6FF-594B8CAF1B37}" type="datetimeFigureOut">
               <a:rPr lang="en-US" smtClean="0"/>
-              <a:t>8/19/14</a:t>
+              <a:t>9/4/14</a:t>
             </a:fld>
             <a:endParaRPr lang="en-US"/>
           </a:p>
@@ -1591,7 +1591,7 @@
           <a:p>
             <a:fld id="{D998C644-8D75-A848-B6FF-594B8CAF1B37}" type="datetimeFigureOut">
               <a:rPr lang="en-US" smtClean="0"/>
-              <a:t>8/19/14</a:t>
+              <a:t>9/4/14</a:t>
             </a:fld>
             <a:endParaRPr lang="en-US"/>
           </a:p>
@@ -1761,7 +1761,7 @@
           <a:p>
             <a:fld id="{D998C644-8D75-A848-B6FF-594B8CAF1B37}" type="datetimeFigureOut">
               <a:rPr lang="en-US" smtClean="0"/>
-              <a:t>8/19/14</a:t>
+              <a:t>9/4/14</a:t>
             </a:fld>
             <a:endParaRPr lang="en-US"/>
           </a:p>
@@ -2007,7 +2007,7 @@
           <a:p>
             <a:fld id="{D998C644-8D75-A848-B6FF-594B8CAF1B37}" type="datetimeFigureOut">
               <a:rPr lang="en-US" smtClean="0"/>
-              <a:t>8/19/14</a:t>
+              <a:t>9/4/14</a:t>
             </a:fld>
             <a:endParaRPr lang="en-US"/>
           </a:p>
@@ -2295,7 +2295,7 @@
           <a:p>
             <a:fld id="{D998C644-8D75-A848-B6FF-594B8CAF1B37}" type="datetimeFigureOut">
               <a:rPr lang="en-US" smtClean="0"/>
-              <a:t>8/19/14</a:t>
+              <a:t>9/4/14</a:t>
             </a:fld>
             <a:endParaRPr lang="en-US"/>
           </a:p>
@@ -2717,7 +2717,7 @@
           <a:p>
             <a:fld id="{D998C644-8D75-A848-B6FF-594B8CAF1B37}" type="datetimeFigureOut">
               <a:rPr lang="en-US" smtClean="0"/>
-              <a:t>8/19/14</a:t>
+              <a:t>9/4/14</a:t>
             </a:fld>
             <a:endParaRPr lang="en-US"/>
           </a:p>
@@ -2835,7 +2835,7 @@
           <a:p>
             <a:fld id="{D998C644-8D75-A848-B6FF-594B8CAF1B37}" type="datetimeFigureOut">
               <a:rPr lang="en-US" smtClean="0"/>
-              <a:t>8/19/14</a:t>
+              <a:t>9/4/14</a:t>
             </a:fld>
             <a:endParaRPr lang="en-US"/>
           </a:p>
@@ -2930,7 +2930,7 @@
           <a:p>
             <a:fld id="{D998C644-8D75-A848-B6FF-594B8CAF1B37}" type="datetimeFigureOut">
               <a:rPr lang="en-US" smtClean="0"/>
-              <a:t>8/19/14</a:t>
+              <a:t>9/4/14</a:t>
             </a:fld>
             <a:endParaRPr lang="en-US"/>
           </a:p>
@@ -3207,7 +3207,7 @@
           <a:p>
             <a:fld id="{D998C644-8D75-A848-B6FF-594B8CAF1B37}" type="datetimeFigureOut">
               <a:rPr lang="en-US" smtClean="0"/>
-              <a:t>8/19/14</a:t>
+              <a:t>9/4/14</a:t>
             </a:fld>
             <a:endParaRPr lang="en-US"/>
           </a:p>
@@ -3460,7 +3460,7 @@
           <a:p>
             <a:fld id="{D998C644-8D75-A848-B6FF-594B8CAF1B37}" type="datetimeFigureOut">
               <a:rPr lang="en-US" smtClean="0"/>
-              <a:t>8/19/14</a:t>
+              <a:t>9/4/14</a:t>
             </a:fld>
             <a:endParaRPr lang="en-US"/>
           </a:p>
@@ -3673,7 +3673,7 @@
           <a:p>
             <a:fld id="{D998C644-8D75-A848-B6FF-594B8CAF1B37}" type="datetimeFigureOut">
               <a:rPr lang="en-US" smtClean="0"/>
-              <a:t>8/19/14</a:t>
+              <a:t>9/4/14</a:t>
             </a:fld>
             <a:endParaRPr lang="en-US"/>
           </a:p>
@@ -4539,14 +4539,12 @@
           </a:p>
           <a:p>
             <a:r>
+              <a:rPr lang="en-US" sz="2800" smtClean="0"/>
+              <a:t>Neural </a:t>
+            </a:r>
+            <a:r>
               <a:rPr lang="en-US" sz="2800" dirty="0" smtClean="0"/>
-              <a:t>Reinforcement learning</a:t>
-            </a:r>
-          </a:p>
-          <a:p>
-            <a:r>
-              <a:rPr lang="en-US" sz="2800" dirty="0" smtClean="0"/>
-              <a:t>Neural networks</a:t>
+              <a:t>networks</a:t>
             </a:r>
           </a:p>
           <a:p>
@@ -5014,6 +5012,13 @@
   <p:clrMapOvr>
     <a:masterClrMapping/>
   </p:clrMapOvr>
+  <p:timing>
+    <p:tnLst>
+      <p:par>
+        <p:cTn xmlns:p14="http://schemas.microsoft.com/office/powerpoint/2010/main" id="1" dur="indefinite" restart="never" nodeType="tmRoot"/>
+      </p:par>
+    </p:tnLst>
+  </p:timing>
 </p:sld>
 </file>
 
@@ -5307,7 +5312,6 @@
               <a:rPr lang="en-US" sz="2800" dirty="0" smtClean="0"/>
               <a:t>Instance/observation/data point</a:t>
             </a:r>
-            <a:endParaRPr lang="en-US" sz="2800" dirty="0" smtClean="0"/>
           </a:p>
           <a:p>
             <a:r>
@@ -5318,7 +5322,7 @@
           <a:p>
             <a:r>
               <a:rPr lang="en-US" sz="2800" dirty="0" smtClean="0"/>
-              <a:t>Class</a:t>
+              <a:t>Class/label</a:t>
             </a:r>
             <a:endParaRPr lang="en-US" dirty="0" smtClean="0"/>
           </a:p>
@@ -5329,23 +5333,15 @@
             </a:r>
           </a:p>
           <a:p>
-            <a:pPr lvl="1"/>
-            <a:r>
-              <a:rPr lang="en-US" sz="2400" dirty="0" smtClean="0"/>
-              <a:t>Nominal</a:t>
-            </a:r>
-          </a:p>
-          <a:p>
-            <a:pPr lvl="1"/>
-            <a:r>
-              <a:rPr lang="en-US" sz="2400" dirty="0" smtClean="0"/>
-              <a:t>Ordinal</a:t>
-            </a:r>
-          </a:p>
-          <a:p>
             <a:r>
               <a:rPr lang="en-US" sz="2800" dirty="0" smtClean="0"/>
               <a:t>Continuous</a:t>
+            </a:r>
+          </a:p>
+          <a:p>
+            <a:r>
+              <a:rPr lang="en-US" sz="2800" dirty="0" err="1" smtClean="0"/>
+              <a:t>Overfitting</a:t>
             </a:r>
             <a:endParaRPr lang="en-US" sz="2400" dirty="0" smtClean="0"/>
           </a:p>

</xml_diff>